<commit_message>
addressed feedback from feng
new fig1, 2, 3, 4
new fig corplot, salience, pars-re
</commit_message>
<xml_diff>
--- a/docs/manuscript/figures/fig1/fig1.pptx
+++ b/docs/manuscript/figures/fig1/fig1.pptx
@@ -110,12 +110,12 @@
   <p:extLst>
     <p:ext uri="{EFAFB233-063F-42B5-8137-9DF3F51BA10A}">
       <p15:sldGuideLst xmlns:p15="http://schemas.microsoft.com/office/powerpoint/2012/main">
-        <p15:guide id="1" orient="horz" pos="96" userDrawn="1">
+        <p15:guide id="1" orient="horz" pos="686" userDrawn="1">
           <p15:clr>
             <a:srgbClr val="A4A3A4"/>
           </p15:clr>
         </p15:guide>
-        <p15:guide id="2" pos="7537" userDrawn="1">
+        <p15:guide id="2" pos="7559" userDrawn="1">
           <p15:clr>
             <a:srgbClr val="A4A3A4"/>
           </p15:clr>
@@ -208,7 +208,7 @@
           <a:p>
             <a:fld id="{086AF35D-AAFF-594B-81FD-7CDDE5E5A6E3}" type="datetimeFigureOut">
               <a:rPr lang="en-US" smtClean="0"/>
-              <a:t>7/2/25</a:t>
+              <a:t>7/5/25</a:t>
             </a:fld>
             <a:endParaRPr lang="en-US"/>
           </a:p>
@@ -709,7 +709,7 @@
           <a:p>
             <a:fld id="{9538E0E9-8D9B-3341-862B-D1A4A4156D8D}" type="datetimeFigureOut">
               <a:rPr lang="en-US" smtClean="0"/>
-              <a:t>7/2/25</a:t>
+              <a:t>7/5/25</a:t>
             </a:fld>
             <a:endParaRPr lang="en-US"/>
           </a:p>
@@ -909,7 +909,7 @@
           <a:p>
             <a:fld id="{9538E0E9-8D9B-3341-862B-D1A4A4156D8D}" type="datetimeFigureOut">
               <a:rPr lang="en-US" smtClean="0"/>
-              <a:t>7/2/25</a:t>
+              <a:t>7/5/25</a:t>
             </a:fld>
             <a:endParaRPr lang="en-US"/>
           </a:p>
@@ -1119,7 +1119,7 @@
           <a:p>
             <a:fld id="{9538E0E9-8D9B-3341-862B-D1A4A4156D8D}" type="datetimeFigureOut">
               <a:rPr lang="en-US" smtClean="0"/>
-              <a:t>7/2/25</a:t>
+              <a:t>7/5/25</a:t>
             </a:fld>
             <a:endParaRPr lang="en-US"/>
           </a:p>
@@ -1319,7 +1319,7 @@
           <a:p>
             <a:fld id="{9538E0E9-8D9B-3341-862B-D1A4A4156D8D}" type="datetimeFigureOut">
               <a:rPr lang="en-US" smtClean="0"/>
-              <a:t>7/2/25</a:t>
+              <a:t>7/5/25</a:t>
             </a:fld>
             <a:endParaRPr lang="en-US"/>
           </a:p>
@@ -1595,7 +1595,7 @@
           <a:p>
             <a:fld id="{9538E0E9-8D9B-3341-862B-D1A4A4156D8D}" type="datetimeFigureOut">
               <a:rPr lang="en-US" smtClean="0"/>
-              <a:t>7/2/25</a:t>
+              <a:t>7/5/25</a:t>
             </a:fld>
             <a:endParaRPr lang="en-US"/>
           </a:p>
@@ -1863,7 +1863,7 @@
           <a:p>
             <a:fld id="{9538E0E9-8D9B-3341-862B-D1A4A4156D8D}" type="datetimeFigureOut">
               <a:rPr lang="en-US" smtClean="0"/>
-              <a:t>7/2/25</a:t>
+              <a:t>7/5/25</a:t>
             </a:fld>
             <a:endParaRPr lang="en-US"/>
           </a:p>
@@ -2278,7 +2278,7 @@
           <a:p>
             <a:fld id="{9538E0E9-8D9B-3341-862B-D1A4A4156D8D}" type="datetimeFigureOut">
               <a:rPr lang="en-US" smtClean="0"/>
-              <a:t>7/2/25</a:t>
+              <a:t>7/5/25</a:t>
             </a:fld>
             <a:endParaRPr lang="en-US"/>
           </a:p>
@@ -2420,7 +2420,7 @@
           <a:p>
             <a:fld id="{9538E0E9-8D9B-3341-862B-D1A4A4156D8D}" type="datetimeFigureOut">
               <a:rPr lang="en-US" smtClean="0"/>
-              <a:t>7/2/25</a:t>
+              <a:t>7/5/25</a:t>
             </a:fld>
             <a:endParaRPr lang="en-US"/>
           </a:p>
@@ -2533,7 +2533,7 @@
           <a:p>
             <a:fld id="{9538E0E9-8D9B-3341-862B-D1A4A4156D8D}" type="datetimeFigureOut">
               <a:rPr lang="en-US" smtClean="0"/>
-              <a:t>7/2/25</a:t>
+              <a:t>7/5/25</a:t>
             </a:fld>
             <a:endParaRPr lang="en-US"/>
           </a:p>
@@ -2846,7 +2846,7 @@
           <a:p>
             <a:fld id="{9538E0E9-8D9B-3341-862B-D1A4A4156D8D}" type="datetimeFigureOut">
               <a:rPr lang="en-US" smtClean="0"/>
-              <a:t>7/2/25</a:t>
+              <a:t>7/5/25</a:t>
             </a:fld>
             <a:endParaRPr lang="en-US"/>
           </a:p>
@@ -3135,7 +3135,7 @@
           <a:p>
             <a:fld id="{9538E0E9-8D9B-3341-862B-D1A4A4156D8D}" type="datetimeFigureOut">
               <a:rPr lang="en-US" smtClean="0"/>
-              <a:t>7/2/25</a:t>
+              <a:t>7/5/25</a:t>
             </a:fld>
             <a:endParaRPr lang="en-US"/>
           </a:p>
@@ -3378,7 +3378,7 @@
           <a:p>
             <a:fld id="{9538E0E9-8D9B-3341-862B-D1A4A4156D8D}" type="datetimeFigureOut">
               <a:rPr lang="en-US" smtClean="0"/>
-              <a:t>7/2/25</a:t>
+              <a:t>7/5/25</a:t>
             </a:fld>
             <a:endParaRPr lang="en-US"/>
           </a:p>
@@ -3809,7 +3809,7 @@
         </p:nvGrpSpPr>
         <p:grpSpPr>
           <a:xfrm>
-            <a:off x="3811626" y="895032"/>
+            <a:off x="3811626" y="1143607"/>
             <a:ext cx="2113471" cy="1457864"/>
             <a:chOff x="1647646" y="1595561"/>
             <a:chExt cx="2113471" cy="1457864"/>
@@ -3964,7 +3964,7 @@
         </p:nvGrpSpPr>
         <p:grpSpPr>
           <a:xfrm>
-            <a:off x="3811627" y="3632943"/>
+            <a:off x="3811627" y="3881518"/>
             <a:ext cx="2113471" cy="1457864"/>
             <a:chOff x="1647646" y="1595561"/>
             <a:chExt cx="2113471" cy="1457864"/>
@@ -4119,7 +4119,7 @@
         </p:nvGrpSpPr>
         <p:grpSpPr>
           <a:xfrm>
-            <a:off x="380387" y="2266307"/>
+            <a:off x="380387" y="2514882"/>
             <a:ext cx="2113471" cy="1457864"/>
             <a:chOff x="1647646" y="1595561"/>
             <a:chExt cx="2113471" cy="1457864"/>
@@ -4235,7 +4235,7 @@
         </p:nvSpPr>
         <p:spPr>
           <a:xfrm>
-            <a:off x="3746290" y="849965"/>
+            <a:off x="3746290" y="1098540"/>
             <a:ext cx="2244141" cy="1548000"/>
           </a:xfrm>
           <a:prstGeom prst="rect">
@@ -4289,7 +4289,7 @@
         </p:nvSpPr>
         <p:spPr>
           <a:xfrm>
-            <a:off x="3746290" y="3587874"/>
+            <a:off x="3746290" y="3836449"/>
             <a:ext cx="2244141" cy="1548000"/>
           </a:xfrm>
           <a:prstGeom prst="rect">
@@ -4341,7 +4341,7 @@
         </p:nvSpPr>
         <p:spPr>
           <a:xfrm>
-            <a:off x="1616840" y="1628604"/>
+            <a:off x="1616840" y="1877179"/>
             <a:ext cx="1854679" cy="457200"/>
           </a:xfrm>
           <a:custGeom>
@@ -4432,7 +4432,7 @@
         </p:nvSpPr>
         <p:spPr>
           <a:xfrm flipV="1">
-            <a:off x="1683694" y="3904674"/>
+            <a:off x="1683694" y="4153249"/>
             <a:ext cx="1854679" cy="457200"/>
           </a:xfrm>
           <a:custGeom>
@@ -4525,7 +4525,7 @@
         </p:nvSpPr>
         <p:spPr>
           <a:xfrm>
-            <a:off x="300038" y="2221239"/>
+            <a:off x="300038" y="2469814"/>
             <a:ext cx="2244141" cy="1548000"/>
           </a:xfrm>
           <a:prstGeom prst="rect">
@@ -4577,7 +4577,7 @@
         </p:nvSpPr>
         <p:spPr>
           <a:xfrm>
-            <a:off x="1740250" y="1172206"/>
+            <a:off x="1740250" y="1420781"/>
             <a:ext cx="1635641" cy="369332"/>
           </a:xfrm>
           <a:prstGeom prst="rect">
@@ -4614,7 +4614,7 @@
         </p:nvSpPr>
         <p:spPr>
           <a:xfrm>
-            <a:off x="1740250" y="4527174"/>
+            <a:off x="1740250" y="4775749"/>
             <a:ext cx="1602298" cy="369332"/>
           </a:xfrm>
           <a:prstGeom prst="rect">
@@ -4653,7 +4653,7 @@
         </p:nvSpPr>
         <p:spPr>
           <a:xfrm>
-            <a:off x="4542953" y="2724990"/>
+            <a:off x="4542953" y="2973565"/>
             <a:ext cx="650815" cy="648000"/>
           </a:xfrm>
           <a:custGeom>
@@ -5517,7 +5517,7 @@
         </p:nvCxnSpPr>
         <p:spPr>
           <a:xfrm>
-            <a:off x="380387" y="5951779"/>
+            <a:off x="380387" y="6315768"/>
             <a:ext cx="6351917" cy="0"/>
           </a:xfrm>
           <a:prstGeom prst="straightConnector1">
@@ -5559,7 +5559,7 @@
         </p:nvSpPr>
         <p:spPr>
           <a:xfrm>
-            <a:off x="657101" y="5527745"/>
+            <a:off x="657101" y="5891734"/>
             <a:ext cx="1560042" cy="369332"/>
           </a:xfrm>
           <a:prstGeom prst="rect">
@@ -5596,7 +5596,7 @@
         </p:nvSpPr>
         <p:spPr>
           <a:xfrm>
-            <a:off x="4173170" y="5527745"/>
+            <a:off x="4173170" y="5891734"/>
             <a:ext cx="1390381" cy="369332"/>
           </a:xfrm>
           <a:prstGeom prst="rect">
@@ -5633,7 +5633,7 @@
         </p:nvSpPr>
         <p:spPr>
           <a:xfrm>
-            <a:off x="5288251" y="2758662"/>
+            <a:off x="5288251" y="3007237"/>
             <a:ext cx="1444053" cy="646331"/>
           </a:xfrm>
           <a:prstGeom prst="rect">
@@ -5701,6 +5701,146 @@
           </a:prstGeom>
         </p:spPr>
       </p:pic>
+      <p:pic>
+        <p:nvPicPr>
+          <p:cNvPr id="3" name="Graphic 2">
+            <a:extLst>
+              <a:ext uri="{FF2B5EF4-FFF2-40B4-BE49-F238E27FC236}">
+                <a16:creationId xmlns:a16="http://schemas.microsoft.com/office/drawing/2014/main" id="{808D6A50-A1DE-0A95-29E7-8FF1B3AFC13E}"/>
+              </a:ext>
+            </a:extLst>
+          </p:cNvPr>
+          <p:cNvPicPr>
+            <a:picLocks noChangeAspect="1"/>
+          </p:cNvPicPr>
+          <p:nvPr/>
+        </p:nvPicPr>
+        <p:blipFill>
+          <a:blip r:embed="rId5">
+            <a:extLst>
+              <a:ext uri="{96DAC541-7B7A-43D3-8B79-37D633B846F1}">
+                <asvg:svgBlip xmlns:asvg="http://schemas.microsoft.com/office/drawing/2016/SVG/main" r:embed="rId6"/>
+              </a:ext>
+            </a:extLst>
+          </a:blip>
+          <a:srcRect/>
+          <a:stretch/>
+        </p:blipFill>
+        <p:spPr>
+          <a:xfrm>
+            <a:off x="7260707" y="5090807"/>
+            <a:ext cx="4251459" cy="1328581"/>
+          </a:xfrm>
+          <a:prstGeom prst="rect">
+            <a:avLst/>
+          </a:prstGeom>
+        </p:spPr>
+      </p:pic>
+      <p:sp>
+        <p:nvSpPr>
+          <p:cNvPr id="8" name="TextBox 7">
+            <a:extLst>
+              <a:ext uri="{FF2B5EF4-FFF2-40B4-BE49-F238E27FC236}">
+                <a16:creationId xmlns:a16="http://schemas.microsoft.com/office/drawing/2014/main" id="{AC0D9F1A-7CB3-65C2-C035-2F60BB458D87}"/>
+              </a:ext>
+            </a:extLst>
+          </p:cNvPr>
+          <p:cNvSpPr txBox="1"/>
+          <p:nvPr/>
+        </p:nvSpPr>
+        <p:spPr>
+          <a:xfrm>
+            <a:off x="331419" y="345139"/>
+            <a:ext cx="365806" cy="461665"/>
+          </a:xfrm>
+          <a:prstGeom prst="rect">
+            <a:avLst/>
+          </a:prstGeom>
+          <a:noFill/>
+        </p:spPr>
+        <p:txBody>
+          <a:bodyPr wrap="none" rtlCol="0">
+            <a:spAutoFit/>
+          </a:bodyPr>
+          <a:lstStyle/>
+          <a:p>
+            <a:r>
+              <a:rPr lang="en-US" sz="2400" dirty="0"/>
+              <a:t>A</a:t>
+            </a:r>
+          </a:p>
+        </p:txBody>
+      </p:sp>
+      <p:sp>
+        <p:nvSpPr>
+          <p:cNvPr id="9" name="TextBox 8">
+            <a:extLst>
+              <a:ext uri="{FF2B5EF4-FFF2-40B4-BE49-F238E27FC236}">
+                <a16:creationId xmlns:a16="http://schemas.microsoft.com/office/drawing/2014/main" id="{C669EDEC-0EE4-BA7F-2F55-B7ED2EC45C93}"/>
+              </a:ext>
+            </a:extLst>
+          </p:cNvPr>
+          <p:cNvSpPr txBox="1"/>
+          <p:nvPr/>
+        </p:nvSpPr>
+        <p:spPr>
+          <a:xfrm>
+            <a:off x="7260707" y="345139"/>
+            <a:ext cx="370614" cy="461665"/>
+          </a:xfrm>
+          <a:prstGeom prst="rect">
+            <a:avLst/>
+          </a:prstGeom>
+          <a:noFill/>
+        </p:spPr>
+        <p:txBody>
+          <a:bodyPr wrap="none" rtlCol="0">
+            <a:spAutoFit/>
+          </a:bodyPr>
+          <a:lstStyle/>
+          <a:p>
+            <a:r>
+              <a:rPr lang="en-US" sz="2400" dirty="0"/>
+              <a:t>B</a:t>
+            </a:r>
+          </a:p>
+        </p:txBody>
+      </p:sp>
+      <p:sp>
+        <p:nvSpPr>
+          <p:cNvPr id="10" name="TextBox 9">
+            <a:extLst>
+              <a:ext uri="{FF2B5EF4-FFF2-40B4-BE49-F238E27FC236}">
+                <a16:creationId xmlns:a16="http://schemas.microsoft.com/office/drawing/2014/main" id="{7F01E43A-DBB2-96DC-8DED-6A7C7B2F8742}"/>
+              </a:ext>
+            </a:extLst>
+          </p:cNvPr>
+          <p:cNvSpPr txBox="1"/>
+          <p:nvPr/>
+        </p:nvSpPr>
+        <p:spPr>
+          <a:xfrm>
+            <a:off x="7260707" y="4592571"/>
+            <a:ext cx="397866" cy="461665"/>
+          </a:xfrm>
+          <a:prstGeom prst="rect">
+            <a:avLst/>
+          </a:prstGeom>
+          <a:noFill/>
+        </p:spPr>
+        <p:txBody>
+          <a:bodyPr wrap="none" rtlCol="0">
+            <a:spAutoFit/>
+          </a:bodyPr>
+          <a:lstStyle/>
+          <a:p>
+            <a:r>
+              <a:rPr lang="en-US" sz="2400" dirty="0"/>
+              <a:t>C</a:t>
+            </a:r>
+          </a:p>
+        </p:txBody>
+      </p:sp>
     </p:spTree>
     <p:extLst>
       <p:ext uri="{BB962C8B-B14F-4D97-AF65-F5344CB8AC3E}">

</xml_diff>